<commit_message>
schémas doc technique terminés
</commit_message>
<xml_diff>
--- a/Documentations - étape 4/Doc technique - schémas/Affichage des items.pptx
+++ b/Documentations - étape 4/Doc technique - schémas/Affichage des items.pptx
@@ -5,7 +5,7 @@
     <p:sldMasterId id="2147483648" r:id="rId1"/>
   </p:sldMasterIdLst>
   <p:sldIdLst>
-    <p:sldId id="256" r:id="rId2"/>
+    <p:sldId id="257" r:id="rId2"/>
   </p:sldIdLst>
   <p:sldSz cx="12192000" cy="6858000"/>
   <p:notesSz cx="6858000" cy="9144000"/>
@@ -243,7 +243,7 @@
           <a:p>
             <a:fld id="{1AC55699-6021-4076-B114-AE099432B093}" type="datetimeFigureOut">
               <a:rPr lang="en-US" smtClean="0"/>
-              <a:t>7/9/2019</a:t>
+              <a:t>7/10/2019</a:t>
             </a:fld>
             <a:endParaRPr lang="en-US"/>
           </a:p>
@@ -413,7 +413,7 @@
           <a:p>
             <a:fld id="{1AC55699-6021-4076-B114-AE099432B093}" type="datetimeFigureOut">
               <a:rPr lang="en-US" smtClean="0"/>
-              <a:t>7/9/2019</a:t>
+              <a:t>7/10/2019</a:t>
             </a:fld>
             <a:endParaRPr lang="en-US"/>
           </a:p>
@@ -593,7 +593,7 @@
           <a:p>
             <a:fld id="{1AC55699-6021-4076-B114-AE099432B093}" type="datetimeFigureOut">
               <a:rPr lang="en-US" smtClean="0"/>
-              <a:t>7/9/2019</a:t>
+              <a:t>7/10/2019</a:t>
             </a:fld>
             <a:endParaRPr lang="en-US"/>
           </a:p>
@@ -763,7 +763,7 @@
           <a:p>
             <a:fld id="{1AC55699-6021-4076-B114-AE099432B093}" type="datetimeFigureOut">
               <a:rPr lang="en-US" smtClean="0"/>
-              <a:t>7/9/2019</a:t>
+              <a:t>7/10/2019</a:t>
             </a:fld>
             <a:endParaRPr lang="en-US"/>
           </a:p>
@@ -1009,7 +1009,7 @@
           <a:p>
             <a:fld id="{1AC55699-6021-4076-B114-AE099432B093}" type="datetimeFigureOut">
               <a:rPr lang="en-US" smtClean="0"/>
-              <a:t>7/9/2019</a:t>
+              <a:t>7/10/2019</a:t>
             </a:fld>
             <a:endParaRPr lang="en-US"/>
           </a:p>
@@ -1241,7 +1241,7 @@
           <a:p>
             <a:fld id="{1AC55699-6021-4076-B114-AE099432B093}" type="datetimeFigureOut">
               <a:rPr lang="en-US" smtClean="0"/>
-              <a:t>7/9/2019</a:t>
+              <a:t>7/10/2019</a:t>
             </a:fld>
             <a:endParaRPr lang="en-US"/>
           </a:p>
@@ -1608,7 +1608,7 @@
           <a:p>
             <a:fld id="{1AC55699-6021-4076-B114-AE099432B093}" type="datetimeFigureOut">
               <a:rPr lang="en-US" smtClean="0"/>
-              <a:t>7/9/2019</a:t>
+              <a:t>7/10/2019</a:t>
             </a:fld>
             <a:endParaRPr lang="en-US"/>
           </a:p>
@@ -1726,7 +1726,7 @@
           <a:p>
             <a:fld id="{1AC55699-6021-4076-B114-AE099432B093}" type="datetimeFigureOut">
               <a:rPr lang="en-US" smtClean="0"/>
-              <a:t>7/9/2019</a:t>
+              <a:t>7/10/2019</a:t>
             </a:fld>
             <a:endParaRPr lang="en-US"/>
           </a:p>
@@ -1821,7 +1821,7 @@
           <a:p>
             <a:fld id="{1AC55699-6021-4076-B114-AE099432B093}" type="datetimeFigureOut">
               <a:rPr lang="en-US" smtClean="0"/>
-              <a:t>7/9/2019</a:t>
+              <a:t>7/10/2019</a:t>
             </a:fld>
             <a:endParaRPr lang="en-US"/>
           </a:p>
@@ -2098,7 +2098,7 @@
           <a:p>
             <a:fld id="{1AC55699-6021-4076-B114-AE099432B093}" type="datetimeFigureOut">
               <a:rPr lang="en-US" smtClean="0"/>
-              <a:t>7/9/2019</a:t>
+              <a:t>7/10/2019</a:t>
             </a:fld>
             <a:endParaRPr lang="en-US"/>
           </a:p>
@@ -2351,7 +2351,7 @@
           <a:p>
             <a:fld id="{1AC55699-6021-4076-B114-AE099432B093}" type="datetimeFigureOut">
               <a:rPr lang="en-US" smtClean="0"/>
-              <a:t>7/9/2019</a:t>
+              <a:t>7/10/2019</a:t>
             </a:fld>
             <a:endParaRPr lang="en-US"/>
           </a:p>
@@ -2564,7 +2564,7 @@
           <a:p>
             <a:fld id="{1AC55699-6021-4076-B114-AE099432B093}" type="datetimeFigureOut">
               <a:rPr lang="en-US" smtClean="0"/>
-              <a:t>7/9/2019</a:t>
+              <a:t>7/10/2019</a:t>
             </a:fld>
             <a:endParaRPr lang="en-US"/>
           </a:p>
@@ -2971,14 +2971,124 @@
       </p:grpSpPr>
       <p:sp>
         <p:nvSpPr>
-          <p:cNvPr id="4" name="Rounded Rectangle 3"/>
+          <p:cNvPr id="4" name="TextBox 3"/>
+          <p:cNvSpPr txBox="1"/>
+          <p:nvPr/>
+        </p:nvSpPr>
+        <p:spPr>
+          <a:xfrm>
+            <a:off x="0" y="0"/>
+            <a:ext cx="12192000" cy="369332"/>
+          </a:xfrm>
+          <a:prstGeom prst="rect">
+            <a:avLst/>
+          </a:prstGeom>
+          <a:noFill/>
+        </p:spPr>
+        <p:txBody>
+          <a:bodyPr wrap="square" rtlCol="0">
+            <a:spAutoFit/>
+          </a:bodyPr>
+          <a:lstStyle/>
+          <a:p>
+            <a:pPr algn="ctr"/>
+            <a:r>
+              <a:rPr lang="en-US" b="1" dirty="0" err="1"/>
+              <a:t>Affichage</a:t>
+            </a:r>
+            <a:r>
+              <a:rPr lang="en-US" b="1" dirty="0"/>
+              <a:t> des items au </a:t>
+            </a:r>
+            <a:r>
+              <a:rPr lang="en-US" b="1" dirty="0" err="1"/>
+              <a:t>démarrage</a:t>
+            </a:r>
+            <a:endParaRPr lang="en-US" b="1" dirty="0"/>
+          </a:p>
+        </p:txBody>
+      </p:sp>
+      <p:sp>
+        <p:nvSpPr>
+          <p:cNvPr id="5" name="TextBox 4"/>
+          <p:cNvSpPr txBox="1"/>
+          <p:nvPr/>
+        </p:nvSpPr>
+        <p:spPr>
+          <a:xfrm>
+            <a:off x="216876" y="1361292"/>
+            <a:ext cx="3563816" cy="369332"/>
+          </a:xfrm>
+          <a:prstGeom prst="rect">
+            <a:avLst/>
+          </a:prstGeom>
+          <a:noFill/>
+        </p:spPr>
+        <p:txBody>
+          <a:bodyPr wrap="square" rtlCol="0">
+            <a:spAutoFit/>
+          </a:bodyPr>
+          <a:lstStyle/>
+          <a:p>
+            <a:r>
+              <a:rPr lang="en-US" dirty="0" err="1"/>
+              <a:t>self.model.read</a:t>
+            </a:r>
+            <a:r>
+              <a:rPr lang="en-US" dirty="0"/>
+              <a:t>(function (data) {</a:t>
+            </a:r>
+          </a:p>
+        </p:txBody>
+      </p:sp>
+      <p:sp>
+        <p:nvSpPr>
+          <p:cNvPr id="6" name="TextBox 5"/>
+          <p:cNvSpPr txBox="1"/>
+          <p:nvPr/>
+        </p:nvSpPr>
+        <p:spPr>
+          <a:xfrm>
+            <a:off x="216877" y="515733"/>
+            <a:ext cx="5451231" cy="369332"/>
+          </a:xfrm>
+          <a:prstGeom prst="rect">
+            <a:avLst/>
+          </a:prstGeom>
+          <a:noFill/>
+        </p:spPr>
+        <p:txBody>
+          <a:bodyPr wrap="square" rtlCol="0">
+            <a:spAutoFit/>
+          </a:bodyPr>
+          <a:lstStyle/>
+          <a:p>
+            <a:r>
+              <a:rPr lang="fr-FR" dirty="0" smtClean="0"/>
+              <a:t>Cette action se déroule en </a:t>
+            </a:r>
+            <a:r>
+              <a:rPr lang="fr-FR" dirty="0" smtClean="0"/>
+              <a:t>deux </a:t>
+            </a:r>
+            <a:r>
+              <a:rPr lang="fr-FR" dirty="0" smtClean="0"/>
+              <a:t>temps :</a:t>
+            </a:r>
+            <a:endParaRPr lang="en-US" dirty="0"/>
+          </a:p>
+        </p:txBody>
+      </p:sp>
+      <p:sp>
+        <p:nvSpPr>
+          <p:cNvPr id="7" name="Rounded Rectangle 6"/>
           <p:cNvSpPr/>
           <p:nvPr/>
         </p:nvSpPr>
         <p:spPr>
           <a:xfrm>
-            <a:off x="4809392" y="1248509"/>
-            <a:ext cx="2277208" cy="1125415"/>
+            <a:off x="3873013" y="1269286"/>
+            <a:ext cx="1652953" cy="447038"/>
           </a:xfrm>
           <a:prstGeom prst="roundRect">
             <a:avLst/>
@@ -3006,12 +3116,8 @@
           <a:p>
             <a:pPr algn="ctr"/>
             <a:r>
-              <a:rPr lang="fr-FR" sz="1600" dirty="0" err="1"/>
-              <a:t>r</a:t>
-            </a:r>
-            <a:r>
               <a:rPr lang="fr-FR" sz="1600" dirty="0" err="1" smtClean="0"/>
-              <a:t>ender.showEntries</a:t>
+              <a:t>showAll</a:t>
             </a:r>
             <a:endParaRPr lang="en-US" sz="1600" dirty="0"/>
           </a:p>
@@ -3019,14 +3125,14 @@
       </p:sp>
       <p:sp>
         <p:nvSpPr>
-          <p:cNvPr id="7" name="TextBox 6"/>
+          <p:cNvPr id="8" name="TextBox 7"/>
           <p:cNvSpPr txBox="1"/>
           <p:nvPr/>
         </p:nvSpPr>
         <p:spPr>
           <a:xfrm>
-            <a:off x="4809392" y="909955"/>
-            <a:ext cx="2277208" cy="338554"/>
+            <a:off x="4062047" y="933054"/>
+            <a:ext cx="1274884" cy="338554"/>
           </a:xfrm>
           <a:prstGeom prst="rect">
             <a:avLst/>
@@ -3041,8 +3147,8 @@
           <a:p>
             <a:pPr algn="ctr"/>
             <a:r>
-              <a:rPr lang="fr-FR" sz="1600" dirty="0" err="1" smtClean="0"/>
-              <a:t>View</a:t>
+              <a:rPr lang="fr-FR" sz="1600" dirty="0" smtClean="0"/>
+              <a:t>Controller</a:t>
             </a:r>
             <a:endParaRPr lang="en-US" sz="1600" dirty="0"/>
           </a:p>
@@ -3050,14 +3156,14 @@
       </p:sp>
       <p:sp>
         <p:nvSpPr>
-          <p:cNvPr id="5" name="Rounded Rectangle 4"/>
+          <p:cNvPr id="11" name="Rounded Rectangle 10"/>
           <p:cNvSpPr/>
           <p:nvPr/>
         </p:nvSpPr>
         <p:spPr>
           <a:xfrm>
-            <a:off x="2998176" y="4478215"/>
-            <a:ext cx="2277208" cy="1125415"/>
+            <a:off x="5838094" y="1269286"/>
+            <a:ext cx="1652953" cy="447038"/>
           </a:xfrm>
           <a:prstGeom prst="roundRect">
             <a:avLst/>
@@ -3094,14 +3200,45 @@
       </p:sp>
       <p:sp>
         <p:nvSpPr>
-          <p:cNvPr id="6" name="Rounded Rectangle 5"/>
+          <p:cNvPr id="15" name="TextBox 14"/>
+          <p:cNvSpPr txBox="1"/>
+          <p:nvPr/>
+        </p:nvSpPr>
+        <p:spPr>
+          <a:xfrm>
+            <a:off x="6027128" y="933054"/>
+            <a:ext cx="1274884" cy="338554"/>
+          </a:xfrm>
+          <a:prstGeom prst="rect">
+            <a:avLst/>
+          </a:prstGeom>
+          <a:noFill/>
+        </p:spPr>
+        <p:txBody>
+          <a:bodyPr wrap="square" rtlCol="0">
+            <a:spAutoFit/>
+          </a:bodyPr>
+          <a:lstStyle/>
+          <a:p>
+            <a:pPr algn="ctr"/>
+            <a:r>
+              <a:rPr lang="fr-FR" sz="1600" dirty="0" smtClean="0"/>
+              <a:t>Model</a:t>
+            </a:r>
+            <a:endParaRPr lang="en-US" sz="1600" dirty="0"/>
+          </a:p>
+        </p:txBody>
+      </p:sp>
+      <p:sp>
+        <p:nvSpPr>
+          <p:cNvPr id="16" name="Rounded Rectangle 15"/>
           <p:cNvSpPr/>
           <p:nvPr/>
         </p:nvSpPr>
         <p:spPr>
           <a:xfrm>
-            <a:off x="6620608" y="4478215"/>
-            <a:ext cx="2277208" cy="1125415"/>
+            <a:off x="7803174" y="1269286"/>
+            <a:ext cx="1652953" cy="447038"/>
           </a:xfrm>
           <a:prstGeom prst="roundRect">
             <a:avLst/>
@@ -3130,7 +3267,7 @@
             <a:pPr algn="ctr"/>
             <a:r>
               <a:rPr lang="fr-FR" sz="1600" dirty="0" err="1" smtClean="0"/>
-              <a:t>showAll</a:t>
+              <a:t>findAll</a:t>
             </a:r>
             <a:endParaRPr lang="en-US" sz="1600" dirty="0"/>
           </a:p>
@@ -3138,14 +3275,14 @@
       </p:sp>
       <p:sp>
         <p:nvSpPr>
-          <p:cNvPr id="8" name="TextBox 7"/>
+          <p:cNvPr id="17" name="TextBox 16"/>
           <p:cNvSpPr txBox="1"/>
           <p:nvPr/>
         </p:nvSpPr>
         <p:spPr>
           <a:xfrm>
-            <a:off x="7086600" y="4139661"/>
-            <a:ext cx="2277208" cy="338554"/>
+            <a:off x="7992208" y="933054"/>
+            <a:ext cx="1274884" cy="338554"/>
           </a:xfrm>
           <a:prstGeom prst="rect">
             <a:avLst/>
@@ -3161,7 +3298,7 @@
             <a:pPr algn="ctr"/>
             <a:r>
               <a:rPr lang="fr-FR" sz="1600" dirty="0" smtClean="0"/>
-              <a:t>Controller</a:t>
+              <a:t>Store</a:t>
             </a:r>
             <a:endParaRPr lang="en-US" sz="1600" dirty="0"/>
           </a:p>
@@ -3169,14 +3306,14 @@
       </p:sp>
       <p:sp>
         <p:nvSpPr>
-          <p:cNvPr id="9" name="TextBox 8"/>
+          <p:cNvPr id="21" name="TextBox 20"/>
           <p:cNvSpPr txBox="1"/>
           <p:nvPr/>
         </p:nvSpPr>
         <p:spPr>
           <a:xfrm>
-            <a:off x="2998176" y="4142591"/>
-            <a:ext cx="2277208" cy="338554"/>
+            <a:off x="216875" y="3887566"/>
+            <a:ext cx="3656137" cy="369332"/>
           </a:xfrm>
           <a:prstGeom prst="rect">
             <a:avLst/>
@@ -3189,25 +3326,35 @@
           </a:bodyPr>
           <a:lstStyle/>
           <a:p>
-            <a:pPr algn="ctr"/>
-            <a:r>
-              <a:rPr lang="fr-FR" sz="1600" dirty="0" smtClean="0"/>
-              <a:t>Model</a:t>
-            </a:r>
-            <a:endParaRPr lang="en-US" sz="1600" dirty="0"/>
-          </a:p>
-        </p:txBody>
-      </p:sp>
-      <p:sp>
-        <p:nvSpPr>
-          <p:cNvPr id="10" name="Rounded Rectangle 9"/>
+            <a:r>
+              <a:rPr lang="en-US" dirty="0" err="1"/>
+              <a:t>self.view.render</a:t>
+            </a:r>
+            <a:r>
+              <a:rPr lang="en-US" dirty="0"/>
+              <a:t>('</a:t>
+            </a:r>
+            <a:r>
+              <a:rPr lang="en-US" dirty="0" err="1"/>
+              <a:t>showEntries</a:t>
+            </a:r>
+            <a:r>
+              <a:rPr lang="en-US" dirty="0"/>
+              <a:t>', data);</a:t>
+            </a:r>
+          </a:p>
+        </p:txBody>
+      </p:sp>
+      <p:sp>
+        <p:nvSpPr>
+          <p:cNvPr id="22" name="Rounded Rectangle 21"/>
           <p:cNvSpPr/>
           <p:nvPr/>
         </p:nvSpPr>
         <p:spPr>
           <a:xfrm>
-            <a:off x="7924800" y="1248509"/>
-            <a:ext cx="2277208" cy="1125415"/>
+            <a:off x="3873013" y="3809860"/>
+            <a:ext cx="1652953" cy="447038"/>
           </a:xfrm>
           <a:prstGeom prst="roundRect">
             <a:avLst/>
@@ -3234,24 +3381,20 @@
           <a:lstStyle/>
           <a:p>
             <a:pPr algn="ctr"/>
-            <a:r>
-              <a:rPr lang="fr-FR" sz="1600" dirty="0" smtClean="0"/>
-              <a:t>show</a:t>
-            </a:r>
             <a:endParaRPr lang="en-US" sz="1600" dirty="0"/>
           </a:p>
         </p:txBody>
       </p:sp>
       <p:sp>
         <p:nvSpPr>
-          <p:cNvPr id="11" name="TextBox 10"/>
+          <p:cNvPr id="23" name="TextBox 22"/>
           <p:cNvSpPr txBox="1"/>
           <p:nvPr/>
         </p:nvSpPr>
         <p:spPr>
           <a:xfrm>
-            <a:off x="7924800" y="909955"/>
-            <a:ext cx="2277208" cy="338554"/>
+            <a:off x="4062047" y="3473628"/>
+            <a:ext cx="1274884" cy="338554"/>
           </a:xfrm>
           <a:prstGeom prst="rect">
             <a:avLst/>
@@ -3267,7 +3410,7 @@
             <a:pPr algn="ctr"/>
             <a:r>
               <a:rPr lang="fr-FR" sz="1600" dirty="0" smtClean="0"/>
-              <a:t>Template</a:t>
+              <a:t>Controller</a:t>
             </a:r>
             <a:endParaRPr lang="en-US" sz="1600" dirty="0"/>
           </a:p>
@@ -3275,14 +3418,14 @@
       </p:sp>
       <p:sp>
         <p:nvSpPr>
-          <p:cNvPr id="12" name="Rounded Rectangle 11"/>
+          <p:cNvPr id="24" name="Rounded Rectangle 23"/>
           <p:cNvSpPr/>
           <p:nvPr/>
         </p:nvSpPr>
         <p:spPr>
           <a:xfrm>
-            <a:off x="99646" y="4478215"/>
-            <a:ext cx="2277208" cy="1125415"/>
+            <a:off x="5838094" y="3809860"/>
+            <a:ext cx="1652953" cy="447038"/>
           </a:xfrm>
           <a:prstGeom prst="roundRect">
             <a:avLst/>
@@ -3311,7 +3454,7 @@
             <a:pPr algn="ctr"/>
             <a:r>
               <a:rPr lang="fr-FR" sz="1600" dirty="0" err="1" smtClean="0"/>
-              <a:t>findAll</a:t>
+              <a:t>showEntries</a:t>
             </a:r>
             <a:endParaRPr lang="en-US" sz="1600" dirty="0"/>
           </a:p>
@@ -3319,14 +3462,14 @@
       </p:sp>
       <p:sp>
         <p:nvSpPr>
-          <p:cNvPr id="13" name="TextBox 12"/>
+          <p:cNvPr id="25" name="TextBox 24"/>
           <p:cNvSpPr txBox="1"/>
           <p:nvPr/>
         </p:nvSpPr>
         <p:spPr>
           <a:xfrm>
-            <a:off x="99646" y="4142591"/>
-            <a:ext cx="2277208" cy="338554"/>
+            <a:off x="6027128" y="3473628"/>
+            <a:ext cx="1274884" cy="338554"/>
           </a:xfrm>
           <a:prstGeom prst="rect">
             <a:avLst/>
@@ -3341,8 +3484,8 @@
           <a:p>
             <a:pPr algn="ctr"/>
             <a:r>
-              <a:rPr lang="fr-FR" sz="1600" dirty="0" smtClean="0"/>
-              <a:t>Store</a:t>
+              <a:rPr lang="fr-FR" sz="1600" dirty="0" err="1" smtClean="0"/>
+              <a:t>View</a:t>
             </a:r>
             <a:endParaRPr lang="en-US" sz="1600" dirty="0"/>
           </a:p>
@@ -3350,17 +3493,17 @@
       </p:sp>
       <p:cxnSp>
         <p:nvCxnSpPr>
-          <p:cNvPr id="14" name="Straight Arrow Connector 13"/>
+          <p:cNvPr id="41" name="Straight Arrow Connector 40"/>
           <p:cNvCxnSpPr>
-            <a:stCxn id="6" idx="1"/>
-            <a:endCxn id="5" idx="3"/>
+            <a:stCxn id="7" idx="3"/>
+            <a:endCxn id="11" idx="1"/>
           </p:cNvCxnSpPr>
           <p:nvPr/>
         </p:nvCxnSpPr>
         <p:spPr>
-          <a:xfrm flipH="1">
-            <a:off x="5275384" y="5040923"/>
-            <a:ext cx="1345224" cy="0"/>
+          <a:xfrm>
+            <a:off x="5525966" y="1492805"/>
+            <a:ext cx="312128" cy="0"/>
           </a:xfrm>
           <a:prstGeom prst="straightConnector1">
             <a:avLst/>
@@ -3386,126 +3529,17 @@
       </p:cxnSp>
       <p:cxnSp>
         <p:nvCxnSpPr>
-          <p:cNvPr id="16" name="Straight Arrow Connector 15"/>
+          <p:cNvPr id="43" name="Straight Arrow Connector 42"/>
           <p:cNvCxnSpPr>
-            <a:stCxn id="5" idx="1"/>
-            <a:endCxn id="12" idx="3"/>
+            <a:stCxn id="11" idx="3"/>
+            <a:endCxn id="16" idx="1"/>
           </p:cNvCxnSpPr>
           <p:nvPr/>
         </p:nvCxnSpPr>
         <p:spPr>
-          <a:xfrm flipH="1">
-            <a:off x="2376854" y="5040923"/>
-            <a:ext cx="621322" cy="0"/>
-          </a:xfrm>
-          <a:prstGeom prst="straightConnector1">
-            <a:avLst/>
-          </a:prstGeom>
-          <a:ln>
-            <a:tailEnd type="triangle"/>
-          </a:ln>
-        </p:spPr>
-        <p:style>
-          <a:lnRef idx="1">
-            <a:schemeClr val="accent1"/>
-          </a:lnRef>
-          <a:fillRef idx="0">
-            <a:schemeClr val="accent1"/>
-          </a:fillRef>
-          <a:effectRef idx="0">
-            <a:schemeClr val="accent1"/>
-          </a:effectRef>
-          <a:fontRef idx="minor">
-            <a:schemeClr val="tx1"/>
-          </a:fontRef>
-        </p:style>
-      </p:cxnSp>
-      <p:sp>
-        <p:nvSpPr>
-          <p:cNvPr id="17" name="TextBox 16"/>
-          <p:cNvSpPr txBox="1"/>
-          <p:nvPr/>
-        </p:nvSpPr>
-        <p:spPr>
-          <a:xfrm>
-            <a:off x="3371848" y="5753099"/>
-            <a:ext cx="1529863" cy="338554"/>
-          </a:xfrm>
-          <a:prstGeom prst="rect">
-            <a:avLst/>
-          </a:prstGeom>
-          <a:noFill/>
-        </p:spPr>
-        <p:txBody>
-          <a:bodyPr wrap="square" rtlCol="0">
-            <a:spAutoFit/>
-          </a:bodyPr>
-          <a:lstStyle/>
-          <a:p>
-            <a:pPr algn="ctr"/>
-            <a:r>
-              <a:rPr lang="fr-FR" sz="1600" dirty="0" smtClean="0"/>
-              <a:t>Sans </a:t>
-            </a:r>
-            <a:r>
-              <a:rPr lang="fr-FR" sz="1600" dirty="0" err="1" smtClean="0"/>
-              <a:t>query</a:t>
-            </a:r>
-            <a:endParaRPr lang="en-US" sz="1600" dirty="0"/>
-          </a:p>
-        </p:txBody>
-      </p:sp>
-      <p:sp>
-        <p:nvSpPr>
-          <p:cNvPr id="18" name="TextBox 17"/>
-          <p:cNvSpPr txBox="1"/>
-          <p:nvPr/>
-        </p:nvSpPr>
-        <p:spPr>
-          <a:xfrm>
-            <a:off x="301869" y="5753099"/>
-            <a:ext cx="1872762" cy="584775"/>
-          </a:xfrm>
-          <a:prstGeom prst="rect">
-            <a:avLst/>
-          </a:prstGeom>
-          <a:noFill/>
-        </p:spPr>
-        <p:txBody>
-          <a:bodyPr wrap="square" rtlCol="0">
-            <a:spAutoFit/>
-          </a:bodyPr>
-          <a:lstStyle/>
-          <a:p>
-            <a:pPr algn="ctr"/>
-            <a:r>
-              <a:rPr lang="fr-FR" sz="1600" dirty="0" smtClean="0"/>
-              <a:t>Retourne tous </a:t>
-            </a:r>
-          </a:p>
-          <a:p>
-            <a:pPr algn="ctr"/>
-            <a:r>
-              <a:rPr lang="fr-FR" sz="1600" dirty="0" smtClean="0"/>
-              <a:t>les items</a:t>
-            </a:r>
-            <a:endParaRPr lang="en-US" sz="1600" dirty="0"/>
-          </a:p>
-        </p:txBody>
-      </p:sp>
-      <p:cxnSp>
-        <p:nvCxnSpPr>
-          <p:cNvPr id="20" name="Straight Arrow Connector 19"/>
-          <p:cNvCxnSpPr>
-            <a:stCxn id="6" idx="0"/>
-            <a:endCxn id="4" idx="2"/>
-          </p:cNvCxnSpPr>
-          <p:nvPr/>
-        </p:nvCxnSpPr>
-        <p:spPr>
-          <a:xfrm flipH="1" flipV="1">
-            <a:off x="5947996" y="2373924"/>
-            <a:ext cx="1811216" cy="2104291"/>
+          <a:xfrm>
+            <a:off x="7491047" y="1492805"/>
+            <a:ext cx="312127" cy="0"/>
           </a:xfrm>
           <a:prstGeom prst="straightConnector1">
             <a:avLst/>
@@ -3531,17 +3565,17 @@
       </p:cxnSp>
       <p:cxnSp>
         <p:nvCxnSpPr>
-          <p:cNvPr id="22" name="Straight Arrow Connector 21"/>
+          <p:cNvPr id="47" name="Straight Arrow Connector 46"/>
           <p:cNvCxnSpPr>
-            <a:stCxn id="4" idx="3"/>
-            <a:endCxn id="10" idx="1"/>
+            <a:stCxn id="22" idx="3"/>
+            <a:endCxn id="24" idx="1"/>
           </p:cNvCxnSpPr>
           <p:nvPr/>
         </p:nvCxnSpPr>
         <p:spPr>
           <a:xfrm>
-            <a:off x="7086600" y="1811217"/>
-            <a:ext cx="838200" cy="0"/>
+            <a:off x="5525966" y="4033379"/>
+            <a:ext cx="312128" cy="0"/>
           </a:xfrm>
           <a:prstGeom prst="straightConnector1">
             <a:avLst/>
@@ -3567,14 +3601,14 @@
       </p:cxnSp>
       <p:sp>
         <p:nvSpPr>
-          <p:cNvPr id="25" name="TextBox 24"/>
+          <p:cNvPr id="44" name="TextBox 43"/>
           <p:cNvSpPr txBox="1"/>
           <p:nvPr/>
         </p:nvSpPr>
         <p:spPr>
           <a:xfrm>
-            <a:off x="1537188" y="1486586"/>
-            <a:ext cx="4267200" cy="646331"/>
+            <a:off x="5838094" y="1696690"/>
+            <a:ext cx="1652953" cy="338554"/>
           </a:xfrm>
           <a:prstGeom prst="rect">
             <a:avLst/>
@@ -3588,38 +3622,23 @@
           <a:lstStyle/>
           <a:p>
             <a:r>
-              <a:rPr lang="en-US" dirty="0"/>
-              <a:t>self.$</a:t>
-            </a:r>
-            <a:r>
-              <a:rPr lang="en-US" dirty="0" err="1"/>
-              <a:t>todoList.innerHTML</a:t>
-            </a:r>
-            <a:r>
-              <a:rPr lang="en-US" dirty="0"/>
-              <a:t> = </a:t>
-            </a:r>
-            <a:r>
-              <a:rPr lang="en-US" dirty="0" err="1"/>
-              <a:t>self.template.show</a:t>
-            </a:r>
-            <a:r>
-              <a:rPr lang="en-US" dirty="0"/>
-              <a:t>(parameter);</a:t>
-            </a:r>
-          </a:p>
-        </p:txBody>
-      </p:sp>
-      <p:sp>
-        <p:nvSpPr>
-          <p:cNvPr id="26" name="TextBox 25"/>
+              <a:rPr lang="en-US" sz="1600" i="1" dirty="0" smtClean="0"/>
+              <a:t>Sans query</a:t>
+            </a:r>
+            <a:endParaRPr lang="en-US" sz="1600" i="1" dirty="0"/>
+          </a:p>
+        </p:txBody>
+      </p:sp>
+      <p:sp>
+        <p:nvSpPr>
+          <p:cNvPr id="46" name="TextBox 45"/>
           <p:cNvSpPr txBox="1"/>
           <p:nvPr/>
         </p:nvSpPr>
         <p:spPr>
           <a:xfrm>
-            <a:off x="0" y="37908"/>
-            <a:ext cx="12192000" cy="369332"/>
+            <a:off x="7803174" y="1696690"/>
+            <a:ext cx="1652953" cy="584775"/>
           </a:xfrm>
           <a:prstGeom prst="rect">
             <a:avLst/>
@@ -3632,33 +3651,197 @@
           </a:bodyPr>
           <a:lstStyle/>
           <a:p>
+            <a:r>
+              <a:rPr lang="en-US" sz="1600" i="1" dirty="0" err="1" smtClean="0"/>
+              <a:t>Retourne</a:t>
+            </a:r>
+            <a:r>
+              <a:rPr lang="en-US" sz="1600" i="1" dirty="0" smtClean="0"/>
+              <a:t> </a:t>
+            </a:r>
+            <a:r>
+              <a:rPr lang="en-US" sz="1600" i="1" dirty="0" err="1" smtClean="0"/>
+              <a:t>tous</a:t>
+            </a:r>
+            <a:r>
+              <a:rPr lang="en-US" sz="1600" i="1" dirty="0" smtClean="0"/>
+              <a:t> </a:t>
+            </a:r>
+          </a:p>
+          <a:p>
+            <a:r>
+              <a:rPr lang="en-US" sz="1600" i="1" dirty="0" smtClean="0"/>
+              <a:t>les items</a:t>
+            </a:r>
+            <a:endParaRPr lang="en-US" sz="1600" i="1" dirty="0"/>
+          </a:p>
+        </p:txBody>
+      </p:sp>
+      <p:sp>
+        <p:nvSpPr>
+          <p:cNvPr id="48" name="Rounded Rectangle 47"/>
+          <p:cNvSpPr/>
+          <p:nvPr/>
+        </p:nvSpPr>
+        <p:spPr>
+          <a:xfrm>
+            <a:off x="7803175" y="3788495"/>
+            <a:ext cx="1652953" cy="447038"/>
+          </a:xfrm>
+          <a:prstGeom prst="roundRect">
+            <a:avLst/>
+          </a:prstGeom>
+        </p:spPr>
+        <p:style>
+          <a:lnRef idx="2">
+            <a:schemeClr val="accent1">
+              <a:shade val="50000"/>
+            </a:schemeClr>
+          </a:lnRef>
+          <a:fillRef idx="1">
+            <a:schemeClr val="accent1"/>
+          </a:fillRef>
+          <a:effectRef idx="0">
+            <a:schemeClr val="accent1"/>
+          </a:effectRef>
+          <a:fontRef idx="minor">
+            <a:schemeClr val="lt1"/>
+          </a:fontRef>
+        </p:style>
+        <p:txBody>
+          <a:bodyPr rtlCol="0" anchor="ctr"/>
+          <a:lstStyle/>
+          <a:p>
             <a:pPr algn="ctr"/>
             <a:r>
-              <a:rPr lang="en-US" b="1" dirty="0" err="1" smtClean="0"/>
-              <a:t>Affichage</a:t>
-            </a:r>
-            <a:r>
-              <a:rPr lang="en-US" b="1" dirty="0" smtClean="0"/>
-              <a:t> des items au </a:t>
-            </a:r>
-            <a:r>
-              <a:rPr lang="en-US" b="1" dirty="0" err="1" smtClean="0"/>
-              <a:t>démarrage</a:t>
-            </a:r>
-            <a:endParaRPr lang="en-US" b="1" dirty="0"/>
+              <a:rPr lang="fr-FR" sz="1600" dirty="0" smtClean="0"/>
+              <a:t>show</a:t>
+            </a:r>
+            <a:endParaRPr lang="en-US" sz="1600" dirty="0"/>
+          </a:p>
+        </p:txBody>
+      </p:sp>
+      <p:sp>
+        <p:nvSpPr>
+          <p:cNvPr id="50" name="TextBox 49"/>
+          <p:cNvSpPr txBox="1"/>
+          <p:nvPr/>
+        </p:nvSpPr>
+        <p:spPr>
+          <a:xfrm>
+            <a:off x="7992209" y="3452263"/>
+            <a:ext cx="1274884" cy="338554"/>
+          </a:xfrm>
+          <a:prstGeom prst="rect">
+            <a:avLst/>
+          </a:prstGeom>
+          <a:noFill/>
+        </p:spPr>
+        <p:txBody>
+          <a:bodyPr wrap="square" rtlCol="0">
+            <a:spAutoFit/>
+          </a:bodyPr>
+          <a:lstStyle/>
+          <a:p>
+            <a:pPr algn="ctr"/>
+            <a:r>
+              <a:rPr lang="fr-FR" sz="1600" dirty="0" smtClean="0"/>
+              <a:t>Template</a:t>
+            </a:r>
+            <a:endParaRPr lang="en-US" sz="1600" dirty="0"/>
+          </a:p>
+        </p:txBody>
+      </p:sp>
+      <p:cxnSp>
+        <p:nvCxnSpPr>
+          <p:cNvPr id="52" name="Straight Arrow Connector 51"/>
+          <p:cNvCxnSpPr>
+            <a:endCxn id="48" idx="1"/>
+          </p:cNvCxnSpPr>
+          <p:nvPr/>
+        </p:nvCxnSpPr>
+        <p:spPr>
+          <a:xfrm>
+            <a:off x="7491047" y="4012014"/>
+            <a:ext cx="312128" cy="0"/>
+          </a:xfrm>
+          <a:prstGeom prst="straightConnector1">
+            <a:avLst/>
+          </a:prstGeom>
+          <a:ln>
+            <a:tailEnd type="triangle"/>
+          </a:ln>
+        </p:spPr>
+        <p:style>
+          <a:lnRef idx="1">
+            <a:schemeClr val="accent1"/>
+          </a:lnRef>
+          <a:fillRef idx="0">
+            <a:schemeClr val="accent1"/>
+          </a:fillRef>
+          <a:effectRef idx="0">
+            <a:schemeClr val="accent1"/>
+          </a:effectRef>
+          <a:fontRef idx="minor">
+            <a:schemeClr val="tx1"/>
+          </a:fontRef>
+        </p:style>
+      </p:cxnSp>
+      <p:sp>
+        <p:nvSpPr>
+          <p:cNvPr id="53" name="TextBox 52"/>
+          <p:cNvSpPr txBox="1"/>
+          <p:nvPr/>
+        </p:nvSpPr>
+        <p:spPr>
+          <a:xfrm>
+            <a:off x="405910" y="2386012"/>
+            <a:ext cx="3656137" cy="923330"/>
+          </a:xfrm>
+          <a:prstGeom prst="rect">
+            <a:avLst/>
+          </a:prstGeom>
+          <a:noFill/>
+        </p:spPr>
+        <p:txBody>
+          <a:bodyPr wrap="square" rtlCol="0">
+            <a:spAutoFit/>
+          </a:bodyPr>
+          <a:lstStyle/>
+          <a:p>
+            <a:r>
+              <a:rPr lang="fr-FR" i="1" dirty="0" smtClean="0"/>
+              <a:t>data mis à jour par le Model est réutilisé par </a:t>
+            </a:r>
+            <a:r>
+              <a:rPr lang="fr-FR" i="1" dirty="0" err="1" smtClean="0"/>
+              <a:t>View</a:t>
+            </a:r>
+            <a:r>
+              <a:rPr lang="fr-FR" i="1" dirty="0" smtClean="0"/>
+              <a:t> pour mettre à jour l’affichage</a:t>
+            </a:r>
+            <a:endParaRPr lang="en-US" i="1" dirty="0"/>
           </a:p>
         </p:txBody>
       </p:sp>
     </p:spTree>
     <p:extLst>
       <p:ext uri="{BB962C8B-B14F-4D97-AF65-F5344CB8AC3E}">
-        <p14:creationId xmlns:p14="http://schemas.microsoft.com/office/powerpoint/2010/main" val="997342300"/>
+        <p14:creationId xmlns:p14="http://schemas.microsoft.com/office/powerpoint/2010/main" val="3601161815"/>
       </p:ext>
     </p:extLst>
   </p:cSld>
   <p:clrMapOvr>
     <a:masterClrMapping/>
   </p:clrMapOvr>
+  <p:timing>
+    <p:tnLst>
+      <p:par>
+        <p:cTn id="1" dur="indefinite" restart="never" nodeType="tmRoot"/>
+      </p:par>
+    </p:tnLst>
+  </p:timing>
 </p:sld>
 </file>
 

</xml_diff>